<commit_message>
minor change figure 2
</commit_message>
<xml_diff>
--- a/figure-assembly/figure-2-components/figure_2_panel_equations.pptx
+++ b/figure-assembly/figure-2-components/figure_2_panel_equations.pptx
@@ -259,7 +259,7 @@
           <a:p>
             <a:fld id="{2E26A54F-8197-FC45-8BC9-6D7422A795DE}" type="datetimeFigureOut">
               <a:rPr lang="en-US" smtClean="0"/>
-              <a:t>10/21/18</a:t>
+              <a:t>10/30/18</a:t>
             </a:fld>
             <a:endParaRPr lang="en-US"/>
           </a:p>
@@ -457,7 +457,7 @@
           <a:p>
             <a:fld id="{2E26A54F-8197-FC45-8BC9-6D7422A795DE}" type="datetimeFigureOut">
               <a:rPr lang="en-US" smtClean="0"/>
-              <a:t>10/21/18</a:t>
+              <a:t>10/30/18</a:t>
             </a:fld>
             <a:endParaRPr lang="en-US"/>
           </a:p>
@@ -665,7 +665,7 @@
           <a:p>
             <a:fld id="{2E26A54F-8197-FC45-8BC9-6D7422A795DE}" type="datetimeFigureOut">
               <a:rPr lang="en-US" smtClean="0"/>
-              <a:t>10/21/18</a:t>
+              <a:t>10/30/18</a:t>
             </a:fld>
             <a:endParaRPr lang="en-US"/>
           </a:p>
@@ -863,7 +863,7 @@
           <a:p>
             <a:fld id="{2E26A54F-8197-FC45-8BC9-6D7422A795DE}" type="datetimeFigureOut">
               <a:rPr lang="en-US" smtClean="0"/>
-              <a:t>10/21/18</a:t>
+              <a:t>10/30/18</a:t>
             </a:fld>
             <a:endParaRPr lang="en-US"/>
           </a:p>
@@ -1138,7 +1138,7 @@
           <a:p>
             <a:fld id="{2E26A54F-8197-FC45-8BC9-6D7422A795DE}" type="datetimeFigureOut">
               <a:rPr lang="en-US" smtClean="0"/>
-              <a:t>10/21/18</a:t>
+              <a:t>10/30/18</a:t>
             </a:fld>
             <a:endParaRPr lang="en-US"/>
           </a:p>
@@ -1403,7 +1403,7 @@
           <a:p>
             <a:fld id="{2E26A54F-8197-FC45-8BC9-6D7422A795DE}" type="datetimeFigureOut">
               <a:rPr lang="en-US" smtClean="0"/>
-              <a:t>10/21/18</a:t>
+              <a:t>10/30/18</a:t>
             </a:fld>
             <a:endParaRPr lang="en-US"/>
           </a:p>
@@ -1815,7 +1815,7 @@
           <a:p>
             <a:fld id="{2E26A54F-8197-FC45-8BC9-6D7422A795DE}" type="datetimeFigureOut">
               <a:rPr lang="en-US" smtClean="0"/>
-              <a:t>10/21/18</a:t>
+              <a:t>10/30/18</a:t>
             </a:fld>
             <a:endParaRPr lang="en-US"/>
           </a:p>
@@ -1956,7 +1956,7 @@
           <a:p>
             <a:fld id="{2E26A54F-8197-FC45-8BC9-6D7422A795DE}" type="datetimeFigureOut">
               <a:rPr lang="en-US" smtClean="0"/>
-              <a:t>10/21/18</a:t>
+              <a:t>10/30/18</a:t>
             </a:fld>
             <a:endParaRPr lang="en-US"/>
           </a:p>
@@ -2069,7 +2069,7 @@
           <a:p>
             <a:fld id="{2E26A54F-8197-FC45-8BC9-6D7422A795DE}" type="datetimeFigureOut">
               <a:rPr lang="en-US" smtClean="0"/>
-              <a:t>10/21/18</a:t>
+              <a:t>10/30/18</a:t>
             </a:fld>
             <a:endParaRPr lang="en-US"/>
           </a:p>
@@ -2380,7 +2380,7 @@
           <a:p>
             <a:fld id="{2E26A54F-8197-FC45-8BC9-6D7422A795DE}" type="datetimeFigureOut">
               <a:rPr lang="en-US" smtClean="0"/>
-              <a:t>10/21/18</a:t>
+              <a:t>10/30/18</a:t>
             </a:fld>
             <a:endParaRPr lang="en-US"/>
           </a:p>
@@ -2668,7 +2668,7 @@
           <a:p>
             <a:fld id="{2E26A54F-8197-FC45-8BC9-6D7422A795DE}" type="datetimeFigureOut">
               <a:rPr lang="en-US" smtClean="0"/>
-              <a:t>10/21/18</a:t>
+              <a:t>10/30/18</a:t>
             </a:fld>
             <a:endParaRPr lang="en-US"/>
           </a:p>
@@ -2909,7 +2909,7 @@
           <a:p>
             <a:fld id="{2E26A54F-8197-FC45-8BC9-6D7422A795DE}" type="datetimeFigureOut">
               <a:rPr lang="en-US" smtClean="0"/>
-              <a:t>10/21/18</a:t>
+              <a:t>10/30/18</a:t>
             </a:fld>
             <a:endParaRPr lang="en-US"/>
           </a:p>
@@ -3984,8 +3984,8 @@
           </p:sp>
         </mc:Fallback>
       </mc:AlternateContent>
-      <mc:AlternateContent xmlns:mc="http://schemas.openxmlformats.org/markup-compatibility/2006" xmlns:a14="http://schemas.microsoft.com/office/drawing/2010/main">
-        <mc:Choice Requires="a14">
+      <mc:AlternateContent xmlns:mc="http://schemas.openxmlformats.org/markup-compatibility/2006">
+        <mc:Choice xmlns:a14="http://schemas.microsoft.com/office/drawing/2010/main" Requires="a14">
           <p:sp>
             <p:nvSpPr>
               <p:cNvPr id="8" name="Rectangle 7">
@@ -4000,8 +4000,8 @@
             </p:nvSpPr>
             <p:spPr>
               <a:xfrm>
-                <a:off x="660038" y="2606540"/>
-                <a:ext cx="4111557" cy="642484"/>
+                <a:off x="510640" y="2606540"/>
+                <a:ext cx="4260956" cy="934871"/>
               </a:xfrm>
               <a:prstGeom prst="rect">
                 <a:avLst/>
@@ -4013,6 +4013,36 @@
               </a:bodyPr>
               <a:lstStyle/>
               <a:p>
+                <a:pPr algn="ctr"/>
+                <a:r>
+                  <a:rPr lang="en-GB" sz="1600" dirty="0">
+                    <a:ea typeface="Cambria Math" panose="02040503050406030204" pitchFamily="18" charset="0"/>
+                  </a:rPr>
+                  <a:t>Growth rate</a:t>
+                </a:r>
+                <a:r>
+                  <a:rPr lang="en-GB" sz="1900" dirty="0">
+                    <a:ea typeface="Cambria Math" panose="02040503050406030204" pitchFamily="18" charset="0"/>
+                  </a:rPr>
+                  <a:t> </a:t>
+                </a:r>
+                <a14:m>
+                  <m:oMath xmlns:m="http://schemas.openxmlformats.org/officeDocument/2006/math">
+                    <m:r>
+                      <a:rPr lang="el-GR" sz="1900" i="1" smtClean="0">
+                        <a:latin typeface="Cambria Math" panose="02040503050406030204" pitchFamily="18" charset="0"/>
+                        <a:ea typeface="Cambria Math" panose="02040503050406030204" pitchFamily="18" charset="0"/>
+                      </a:rPr>
+                      <m:t>𝛼</m:t>
+                    </m:r>
+                  </m:oMath>
+                </a14:m>
+                <a:endParaRPr lang="en-GB" sz="1900" b="0" i="0" dirty="0">
+                  <a:latin typeface="Cambria Math" panose="02040503050406030204" pitchFamily="18" charset="0"/>
+                  <a:ea typeface="Cambria Math" panose="02040503050406030204" pitchFamily="18" charset="0"/>
+                </a:endParaRPr>
+              </a:p>
+              <a:p>
                 <a:pPr/>
                 <a14:m>
                   <m:oMathPara xmlns:m="http://schemas.openxmlformats.org/officeDocument/2006/math">
@@ -4021,7 +4051,13 @@
                     </m:oMathParaPr>
                     <m:oMath xmlns:m="http://schemas.openxmlformats.org/officeDocument/2006/math">
                       <m:r>
-                        <a:rPr lang="ar-AE" sz="1900">
+                        <a:rPr lang="en-GB" sz="1900" b="0" i="0" smtClean="0">
+                          <a:latin typeface="Cambria Math" panose="02040503050406030204" pitchFamily="18" charset="0"/>
+                        </a:rPr>
+                        <m:t>=</m:t>
+                      </m:r>
+                      <m:r>
+                        <a:rPr lang="ar-AE" sz="1900" smtClean="0">
                           <a:latin typeface="Cambria Math" panose="02040503050406030204" pitchFamily="18" charset="0"/>
                         </a:rPr>
                         <m:t>𝑘</m:t>
@@ -4262,7 +4298,7 @@
             </p:txBody>
           </p:sp>
         </mc:Choice>
-        <mc:Fallback xmlns="">
+        <mc:Fallback>
           <p:sp>
             <p:nvSpPr>
               <p:cNvPr id="8" name="Rectangle 7">
@@ -4279,8 +4315,8 @@
             </p:nvSpPr>
             <p:spPr>
               <a:xfrm>
-                <a:off x="660038" y="2606540"/>
-                <a:ext cx="4111557" cy="642484"/>
+                <a:off x="510640" y="2606540"/>
+                <a:ext cx="4260956" cy="934871"/>
               </a:xfrm>
               <a:prstGeom prst="rect">
                 <a:avLst/>
@@ -4288,7 +4324,7 @@
               <a:blipFill>
                 <a:blip r:embed="rId5"/>
                 <a:stretch>
-                  <a:fillRect b="-1923"/>
+                  <a:fillRect b="-1333"/>
                 </a:stretch>
               </a:blipFill>
             </p:spPr>
@@ -4670,7 +4706,7 @@
         </p:nvSpPr>
         <p:spPr>
           <a:xfrm>
-            <a:off x="843949" y="3302056"/>
+            <a:off x="843949" y="3527686"/>
             <a:ext cx="3743734" cy="523220"/>
           </a:xfrm>
           <a:prstGeom prst="rect">

</xml_diff>